<commit_message>
Document local configuration for publicresults
</commit_message>
<xml_diff>
--- a/docs/img/PublicResults/LocalPublicResults.pptx
+++ b/docs/img/PublicResults/LocalPublicResults.pptx
@@ -301,7 +301,7 @@
               <a:pPr>
                 <a:defRPr/>
               </a:pPr>
-              <a:t>2020-07-11</a:t>
+              <a:t>2020-07-12</a:t>
             </a:fld>
             <a:endParaRPr lang="fr-CA"/>
           </a:p>
@@ -516,7 +516,7 @@
               <a:pPr>
                 <a:defRPr/>
               </a:pPr>
-              <a:t>2020-07-11</a:t>
+              <a:t>2020-07-12</a:t>
             </a:fld>
             <a:endParaRPr lang="fr-CA"/>
           </a:p>
@@ -741,7 +741,7 @@
               <a:pPr>
                 <a:defRPr/>
               </a:pPr>
-              <a:t>2020-07-11</a:t>
+              <a:t>2020-07-12</a:t>
             </a:fld>
             <a:endParaRPr lang="fr-CA"/>
           </a:p>
@@ -956,7 +956,7 @@
               <a:pPr>
                 <a:defRPr/>
               </a:pPr>
-              <a:t>2020-07-11</a:t>
+              <a:t>2020-07-12</a:t>
             </a:fld>
             <a:endParaRPr lang="fr-CA"/>
           </a:p>
@@ -1247,7 +1247,7 @@
               <a:pPr>
                 <a:defRPr/>
               </a:pPr>
-              <a:t>2020-07-11</a:t>
+              <a:t>2020-07-12</a:t>
             </a:fld>
             <a:endParaRPr lang="fr-CA"/>
           </a:p>
@@ -1524,7 +1524,7 @@
               <a:pPr>
                 <a:defRPr/>
               </a:pPr>
-              <a:t>2020-07-11</a:t>
+              <a:t>2020-07-12</a:t>
             </a:fld>
             <a:endParaRPr lang="fr-CA"/>
           </a:p>
@@ -1936,7 +1936,7 @@
               <a:pPr>
                 <a:defRPr/>
               </a:pPr>
-              <a:t>2020-07-11</a:t>
+              <a:t>2020-07-12</a:t>
             </a:fld>
             <a:endParaRPr lang="fr-CA"/>
           </a:p>
@@ -2099,7 +2099,7 @@
               <a:pPr>
                 <a:defRPr/>
               </a:pPr>
-              <a:t>2020-07-11</a:t>
+              <a:t>2020-07-12</a:t>
             </a:fld>
             <a:endParaRPr lang="fr-CA"/>
           </a:p>
@@ -2239,7 +2239,7 @@
               <a:pPr>
                 <a:defRPr/>
               </a:pPr>
-              <a:t>2020-07-11</a:t>
+              <a:t>2020-07-12</a:t>
             </a:fld>
             <a:endParaRPr lang="fr-CA"/>
           </a:p>
@@ -2561,7 +2561,7 @@
               <a:pPr>
                 <a:defRPr/>
               </a:pPr>
-              <a:t>2020-07-11</a:t>
+              <a:t>2020-07-12</a:t>
             </a:fld>
             <a:endParaRPr lang="fr-CA"/>
           </a:p>
@@ -2862,7 +2862,7 @@
               <a:pPr>
                 <a:defRPr/>
               </a:pPr>
-              <a:t>2020-07-11</a:t>
+              <a:t>2020-07-12</a:t>
             </a:fld>
             <a:endParaRPr lang="fr-CA"/>
           </a:p>
@@ -3189,7 +3189,7 @@
               <a:pPr>
                 <a:defRPr/>
               </a:pPr>
-              <a:t>2020-07-11</a:t>
+              <a:t>2020-07-12</a:t>
             </a:fld>
             <a:endParaRPr lang="fr-CA"/>
           </a:p>
@@ -8034,6 +8034,7 @@
             </a:avLst>
           </a:prstGeom>
           <a:ln w="76200">
+            <a:headEnd type="triangle"/>
             <a:tailEnd type="triangle"/>
           </a:ln>
         </p:spPr>

</xml_diff>

<commit_message>
update docs for local publicresults
</commit_message>
<xml_diff>
--- a/docs/img/PublicResults/LocalPublicResults.pptx
+++ b/docs/img/PublicResults/LocalPublicResults.pptx
@@ -300,7 +300,7 @@
               <a:pPr>
                 <a:defRPr/>
               </a:pPr>
-              <a:t>2020-08-07</a:t>
+              <a:t>2020-08-08</a:t>
             </a:fld>
             <a:endParaRPr lang="fr-CA"/>
           </a:p>
@@ -515,7 +515,7 @@
               <a:pPr>
                 <a:defRPr/>
               </a:pPr>
-              <a:t>2020-08-07</a:t>
+              <a:t>2020-08-08</a:t>
             </a:fld>
             <a:endParaRPr lang="fr-CA"/>
           </a:p>
@@ -740,7 +740,7 @@
               <a:pPr>
                 <a:defRPr/>
               </a:pPr>
-              <a:t>2020-08-07</a:t>
+              <a:t>2020-08-08</a:t>
             </a:fld>
             <a:endParaRPr lang="fr-CA"/>
           </a:p>
@@ -955,7 +955,7 @@
               <a:pPr>
                 <a:defRPr/>
               </a:pPr>
-              <a:t>2020-08-07</a:t>
+              <a:t>2020-08-08</a:t>
             </a:fld>
             <a:endParaRPr lang="fr-CA"/>
           </a:p>
@@ -1246,7 +1246,7 @@
               <a:pPr>
                 <a:defRPr/>
               </a:pPr>
-              <a:t>2020-08-07</a:t>
+              <a:t>2020-08-08</a:t>
             </a:fld>
             <a:endParaRPr lang="fr-CA"/>
           </a:p>
@@ -1523,7 +1523,7 @@
               <a:pPr>
                 <a:defRPr/>
               </a:pPr>
-              <a:t>2020-08-07</a:t>
+              <a:t>2020-08-08</a:t>
             </a:fld>
             <a:endParaRPr lang="fr-CA"/>
           </a:p>
@@ -1935,7 +1935,7 @@
               <a:pPr>
                 <a:defRPr/>
               </a:pPr>
-              <a:t>2020-08-07</a:t>
+              <a:t>2020-08-08</a:t>
             </a:fld>
             <a:endParaRPr lang="fr-CA"/>
           </a:p>
@@ -2098,7 +2098,7 @@
               <a:pPr>
                 <a:defRPr/>
               </a:pPr>
-              <a:t>2020-08-07</a:t>
+              <a:t>2020-08-08</a:t>
             </a:fld>
             <a:endParaRPr lang="fr-CA"/>
           </a:p>
@@ -2238,7 +2238,7 @@
               <a:pPr>
                 <a:defRPr/>
               </a:pPr>
-              <a:t>2020-08-07</a:t>
+              <a:t>2020-08-08</a:t>
             </a:fld>
             <a:endParaRPr lang="fr-CA"/>
           </a:p>
@@ -2560,7 +2560,7 @@
               <a:pPr>
                 <a:defRPr/>
               </a:pPr>
-              <a:t>2020-08-07</a:t>
+              <a:t>2020-08-08</a:t>
             </a:fld>
             <a:endParaRPr lang="fr-CA"/>
           </a:p>
@@ -2861,7 +2861,7 @@
               <a:pPr>
                 <a:defRPr/>
               </a:pPr>
-              <a:t>2020-08-07</a:t>
+              <a:t>2020-08-08</a:t>
             </a:fld>
             <a:endParaRPr lang="fr-CA"/>
           </a:p>
@@ -3188,7 +3188,7 @@
               <a:pPr>
                 <a:defRPr/>
               </a:pPr>
-              <a:t>2020-08-07</a:t>
+              <a:t>2020-08-08</a:t>
             </a:fld>
             <a:endParaRPr lang="fr-CA"/>
           </a:p>
@@ -4922,8 +4922,8 @@
         </p:nvSpPr>
         <p:spPr bwMode="auto">
           <a:xfrm>
-            <a:off x="4397375" y="4232275"/>
-            <a:ext cx="1085554" cy="553998"/>
+            <a:off x="4320428" y="4232275"/>
+            <a:ext cx="1085555" cy="553998"/>
           </a:xfrm>
           <a:prstGeom prst="rect">
             <a:avLst/>
@@ -5134,7 +5134,7 @@
             </a:br>
             <a:r>
               <a:rPr lang="fr-CA" sz="1200" dirty="0"/>
-              <a:t>192.168.1.116</a:t>
+              <a:t>192.168.4.100</a:t>
             </a:r>
             <a:endParaRPr lang="fr-CA" altLang="fr-FR" sz="1800" dirty="0"/>
           </a:p>
@@ -5219,7 +5219,7 @@
         <p:spPr>
           <a:xfrm flipV="1">
             <a:off x="2178050" y="4786273"/>
-            <a:ext cx="2762102" cy="731877"/>
+            <a:ext cx="2685156" cy="731877"/>
           </a:xfrm>
           <a:prstGeom prst="curvedConnector2">
             <a:avLst/>
@@ -5981,7 +5981,7 @@
             </a:r>
             <a:r>
               <a:rPr lang="fr-CA" altLang="fr-FR" sz="1400" i="1" dirty="0"/>
-              <a:t> Network (192.168.1.x)</a:t>
+              <a:t> Network (192.168.4.x)</a:t>
             </a:r>
           </a:p>
         </p:txBody>
@@ -8335,7 +8335,7 @@
         <p:spPr>
           <a:xfrm flipV="1">
             <a:off x="4200525" y="4786273"/>
-            <a:ext cx="739627" cy="1014452"/>
+            <a:ext cx="662681" cy="1014452"/>
           </a:xfrm>
           <a:prstGeom prst="curvedConnector2">
             <a:avLst/>

</xml_diff>